<commit_message>
Updated image and slides pptx
</commit_message>
<xml_diff>
--- a/_admin/image_slides/images-for-workshop-ex09-tut02.pptx
+++ b/_admin/image_slides/images-for-workshop-ex09-tut02.pptx
@@ -6,17 +6,18 @@
   </p:sldMasterIdLst>
   <p:sldIdLst>
     <p:sldId id="283" r:id="rId2"/>
-    <p:sldId id="279" r:id="rId3"/>
-    <p:sldId id="280" r:id="rId4"/>
-    <p:sldId id="282" r:id="rId5"/>
-    <p:sldId id="258" r:id="rId6"/>
-    <p:sldId id="259" r:id="rId7"/>
-    <p:sldId id="260" r:id="rId8"/>
-    <p:sldId id="277" r:id="rId9"/>
-    <p:sldId id="262" r:id="rId10"/>
-    <p:sldId id="278" r:id="rId11"/>
-    <p:sldId id="270" r:id="rId12"/>
-    <p:sldId id="273" r:id="rId13"/>
+    <p:sldId id="284" r:id="rId3"/>
+    <p:sldId id="279" r:id="rId4"/>
+    <p:sldId id="280" r:id="rId5"/>
+    <p:sldId id="282" r:id="rId6"/>
+    <p:sldId id="258" r:id="rId7"/>
+    <p:sldId id="259" r:id="rId8"/>
+    <p:sldId id="260" r:id="rId9"/>
+    <p:sldId id="277" r:id="rId10"/>
+    <p:sldId id="262" r:id="rId11"/>
+    <p:sldId id="278" r:id="rId12"/>
+    <p:sldId id="270" r:id="rId13"/>
+    <p:sldId id="273" r:id="rId14"/>
   </p:sldIdLst>
   <p:sldSz cx="12192000" cy="6858000"/>
   <p:notesSz cx="6858000" cy="9144000"/>
@@ -115,6 +116,11 @@
       </a:defRPr>
     </a:lvl9pPr>
   </p:defaultTextStyle>
+  <p:extLst>
+    <p:ext uri="{EFAFB233-063F-42B5-8137-9DF3F51BA10A}">
+      <p15:sldGuideLst xmlns:p15="http://schemas.microsoft.com/office/powerpoint/2012/main"/>
+    </p:ext>
+  </p:extLst>
 </p:presentation>
 </file>
 
@@ -249,7 +255,7 @@
           <a:p>
             <a:fld id="{17DF0FE8-6185-4767-9626-904DB349539B}" type="datetimeFigureOut">
               <a:rPr lang="en-GB" smtClean="0"/>
-              <a:t>22/07/2021</a:t>
+              <a:t>28/07/2021</a:t>
             </a:fld>
             <a:endParaRPr lang="en-GB"/>
           </a:p>
@@ -419,7 +425,7 @@
           <a:p>
             <a:fld id="{17DF0FE8-6185-4767-9626-904DB349539B}" type="datetimeFigureOut">
               <a:rPr lang="en-GB" smtClean="0"/>
-              <a:t>22/07/2021</a:t>
+              <a:t>28/07/2021</a:t>
             </a:fld>
             <a:endParaRPr lang="en-GB"/>
           </a:p>
@@ -599,7 +605,7 @@
           <a:p>
             <a:fld id="{17DF0FE8-6185-4767-9626-904DB349539B}" type="datetimeFigureOut">
               <a:rPr lang="en-GB" smtClean="0"/>
-              <a:t>22/07/2021</a:t>
+              <a:t>28/07/2021</a:t>
             </a:fld>
             <a:endParaRPr lang="en-GB"/>
           </a:p>
@@ -769,7 +775,7 @@
           <a:p>
             <a:fld id="{17DF0FE8-6185-4767-9626-904DB349539B}" type="datetimeFigureOut">
               <a:rPr lang="en-GB" smtClean="0"/>
-              <a:t>22/07/2021</a:t>
+              <a:t>28/07/2021</a:t>
             </a:fld>
             <a:endParaRPr lang="en-GB"/>
           </a:p>
@@ -1015,7 +1021,7 @@
           <a:p>
             <a:fld id="{17DF0FE8-6185-4767-9626-904DB349539B}" type="datetimeFigureOut">
               <a:rPr lang="en-GB" smtClean="0"/>
-              <a:t>22/07/2021</a:t>
+              <a:t>28/07/2021</a:t>
             </a:fld>
             <a:endParaRPr lang="en-GB"/>
           </a:p>
@@ -1247,7 +1253,7 @@
           <a:p>
             <a:fld id="{17DF0FE8-6185-4767-9626-904DB349539B}" type="datetimeFigureOut">
               <a:rPr lang="en-GB" smtClean="0"/>
-              <a:t>22/07/2021</a:t>
+              <a:t>28/07/2021</a:t>
             </a:fld>
             <a:endParaRPr lang="en-GB"/>
           </a:p>
@@ -1614,7 +1620,7 @@
           <a:p>
             <a:fld id="{17DF0FE8-6185-4767-9626-904DB349539B}" type="datetimeFigureOut">
               <a:rPr lang="en-GB" smtClean="0"/>
-              <a:t>22/07/2021</a:t>
+              <a:t>28/07/2021</a:t>
             </a:fld>
             <a:endParaRPr lang="en-GB"/>
           </a:p>
@@ -1732,7 +1738,7 @@
           <a:p>
             <a:fld id="{17DF0FE8-6185-4767-9626-904DB349539B}" type="datetimeFigureOut">
               <a:rPr lang="en-GB" smtClean="0"/>
-              <a:t>22/07/2021</a:t>
+              <a:t>28/07/2021</a:t>
             </a:fld>
             <a:endParaRPr lang="en-GB"/>
           </a:p>
@@ -1827,7 +1833,7 @@
           <a:p>
             <a:fld id="{17DF0FE8-6185-4767-9626-904DB349539B}" type="datetimeFigureOut">
               <a:rPr lang="en-GB" smtClean="0"/>
-              <a:t>22/07/2021</a:t>
+              <a:t>28/07/2021</a:t>
             </a:fld>
             <a:endParaRPr lang="en-GB"/>
           </a:p>
@@ -2104,7 +2110,7 @@
           <a:p>
             <a:fld id="{17DF0FE8-6185-4767-9626-904DB349539B}" type="datetimeFigureOut">
               <a:rPr lang="en-GB" smtClean="0"/>
-              <a:t>22/07/2021</a:t>
+              <a:t>28/07/2021</a:t>
             </a:fld>
             <a:endParaRPr lang="en-GB"/>
           </a:p>
@@ -2357,7 +2363,7 @@
           <a:p>
             <a:fld id="{17DF0FE8-6185-4767-9626-904DB349539B}" type="datetimeFigureOut">
               <a:rPr lang="en-GB" smtClean="0"/>
-              <a:t>22/07/2021</a:t>
+              <a:t>28/07/2021</a:t>
             </a:fld>
             <a:endParaRPr lang="en-GB"/>
           </a:p>
@@ -2570,7 +2576,7 @@
           <a:p>
             <a:fld id="{17DF0FE8-6185-4767-9626-904DB349539B}" type="datetimeFigureOut">
               <a:rPr lang="en-GB" smtClean="0"/>
-              <a:t>22/07/2021</a:t>
+              <a:t>28/07/2021</a:t>
             </a:fld>
             <a:endParaRPr lang="en-GB"/>
           </a:p>
@@ -3079,6 +3085,65 @@
       </p:grpSpPr>
       <p:pic>
         <p:nvPicPr>
+          <p:cNvPr id="3" name="Picture 2"/>
+          <p:cNvPicPr>
+            <a:picLocks noChangeAspect="1"/>
+          </p:cNvPicPr>
+          <p:nvPr/>
+        </p:nvPicPr>
+        <p:blipFill>
+          <a:blip r:embed="rId2"/>
+          <a:stretch>
+            <a:fillRect/>
+          </a:stretch>
+        </p:blipFill>
+        <p:spPr>
+          <a:xfrm>
+            <a:off x="1930400" y="620712"/>
+            <a:ext cx="7137400" cy="4014788"/>
+          </a:xfrm>
+          <a:prstGeom prst="rect">
+            <a:avLst/>
+          </a:prstGeom>
+          <a:ln>
+            <a:solidFill>
+              <a:schemeClr val="tx1"/>
+            </a:solidFill>
+          </a:ln>
+        </p:spPr>
+      </p:pic>
+    </p:spTree>
+    <p:extLst>
+      <p:ext uri="{BB962C8B-B14F-4D97-AF65-F5344CB8AC3E}">
+        <p14:creationId xmlns:p14="http://schemas.microsoft.com/office/powerpoint/2010/main" val="3486349836"/>
+      </p:ext>
+    </p:extLst>
+  </p:cSld>
+  <p:clrMapOvr>
+    <a:masterClrMapping/>
+  </p:clrMapOvr>
+</p:sld>
+</file>
+
+<file path=ppt/slides/slide11.xml><?xml version="1.0" encoding="utf-8"?>
+<p:sld xmlns:a="http://schemas.openxmlformats.org/drawingml/2006/main" xmlns:r="http://schemas.openxmlformats.org/officeDocument/2006/relationships" xmlns:p="http://schemas.openxmlformats.org/presentationml/2006/main">
+  <p:cSld>
+    <p:spTree>
+      <p:nvGrpSpPr>
+        <p:cNvPr id="1" name=""/>
+        <p:cNvGrpSpPr/>
+        <p:nvPr/>
+      </p:nvGrpSpPr>
+      <p:grpSpPr>
+        <a:xfrm>
+          <a:off x="0" y="0"/>
+          <a:ext cx="0" cy="0"/>
+          <a:chOff x="0" y="0"/>
+          <a:chExt cx="0" cy="0"/>
+        </a:xfrm>
+      </p:grpSpPr>
+      <p:pic>
+        <p:nvPicPr>
           <p:cNvPr id="5" name="Picture 4"/>
           <p:cNvPicPr>
             <a:picLocks noChangeAspect="1"/>
@@ -3206,7 +3271,7 @@
 </p:sld>
 </file>
 
-<file path=ppt/slides/slide11.xml><?xml version="1.0" encoding="utf-8"?>
+<file path=ppt/slides/slide12.xml><?xml version="1.0" encoding="utf-8"?>
 <p:sld xmlns:a="http://schemas.openxmlformats.org/drawingml/2006/main" xmlns:r="http://schemas.openxmlformats.org/officeDocument/2006/relationships" xmlns:p="http://schemas.openxmlformats.org/presentationml/2006/main">
   <p:cSld>
     <p:spTree>
@@ -3302,7 +3367,7 @@
 </p:sld>
 </file>
 
-<file path=ppt/slides/slide12.xml><?xml version="1.0" encoding="utf-8"?>
+<file path=ppt/slides/slide13.xml><?xml version="1.0" encoding="utf-8"?>
 <p:sld xmlns:a="http://schemas.openxmlformats.org/drawingml/2006/main" xmlns:r="http://schemas.openxmlformats.org/officeDocument/2006/relationships" xmlns:p="http://schemas.openxmlformats.org/presentationml/2006/main">
   <p:cSld>
     <p:spTree>
@@ -3400,6 +3465,64 @@
 </file>
 
 <file path=ppt/slides/slide2.xml><?xml version="1.0" encoding="utf-8"?>
+<p:sld xmlns:a="http://schemas.openxmlformats.org/drawingml/2006/main" xmlns:r="http://schemas.openxmlformats.org/officeDocument/2006/relationships" xmlns:p="http://schemas.openxmlformats.org/presentationml/2006/main">
+  <p:cSld>
+    <p:spTree>
+      <p:nvGrpSpPr>
+        <p:cNvPr id="1" name=""/>
+        <p:cNvGrpSpPr/>
+        <p:nvPr/>
+      </p:nvGrpSpPr>
+      <p:grpSpPr>
+        <a:xfrm>
+          <a:off x="0" y="0"/>
+          <a:ext cx="0" cy="0"/>
+          <a:chOff x="0" y="0"/>
+          <a:chExt cx="0" cy="0"/>
+        </a:xfrm>
+      </p:grpSpPr>
+      <p:pic>
+        <p:nvPicPr>
+          <p:cNvPr id="4" name="Picture 3"/>
+          <p:cNvPicPr>
+            <a:picLocks noChangeAspect="1"/>
+          </p:cNvPicPr>
+          <p:nvPr/>
+        </p:nvPicPr>
+        <p:blipFill rotWithShape="1">
+          <a:blip r:embed="rId2"/>
+          <a:srcRect t="8213"/>
+          <a:stretch/>
+        </p:blipFill>
+        <p:spPr>
+          <a:xfrm>
+            <a:off x="1095375" y="1552353"/>
+            <a:ext cx="4086225" cy="2994246"/>
+          </a:xfrm>
+          <a:prstGeom prst="rect">
+            <a:avLst/>
+          </a:prstGeom>
+          <a:ln>
+            <a:solidFill>
+              <a:schemeClr val="tx1"/>
+            </a:solidFill>
+          </a:ln>
+        </p:spPr>
+      </p:pic>
+    </p:spTree>
+    <p:extLst>
+      <p:ext uri="{BB962C8B-B14F-4D97-AF65-F5344CB8AC3E}">
+        <p14:creationId xmlns:p14="http://schemas.microsoft.com/office/powerpoint/2010/main" val="593961555"/>
+      </p:ext>
+    </p:extLst>
+  </p:cSld>
+  <p:clrMapOvr>
+    <a:masterClrMapping/>
+  </p:clrMapOvr>
+</p:sld>
+</file>
+
+<file path=ppt/slides/slide3.xml><?xml version="1.0" encoding="utf-8"?>
 <p:sld xmlns:a="http://schemas.openxmlformats.org/drawingml/2006/main" xmlns:r="http://schemas.openxmlformats.org/officeDocument/2006/relationships" xmlns:p="http://schemas.openxmlformats.org/presentationml/2006/main">
   <p:cSld>
     <p:spTree>
@@ -3562,7 +3685,7 @@
 </p:sld>
 </file>
 
-<file path=ppt/slides/slide3.xml><?xml version="1.0" encoding="utf-8"?>
+<file path=ppt/slides/slide4.xml><?xml version="1.0" encoding="utf-8"?>
 <p:sld xmlns:a="http://schemas.openxmlformats.org/drawingml/2006/main" xmlns:r="http://schemas.openxmlformats.org/officeDocument/2006/relationships" xmlns:p="http://schemas.openxmlformats.org/presentationml/2006/main">
   <p:cSld>
     <p:spTree>
@@ -3676,7 +3799,7 @@
 </p:sld>
 </file>
 
-<file path=ppt/slides/slide4.xml><?xml version="1.0" encoding="utf-8"?>
+<file path=ppt/slides/slide5.xml><?xml version="1.0" encoding="utf-8"?>
 <p:sld xmlns:a="http://schemas.openxmlformats.org/drawingml/2006/main" xmlns:r="http://schemas.openxmlformats.org/officeDocument/2006/relationships" xmlns:p="http://schemas.openxmlformats.org/presentationml/2006/main">
   <p:cSld>
     <p:spTree>
@@ -3772,7 +3895,7 @@
 </p:sld>
 </file>
 
-<file path=ppt/slides/slide5.xml><?xml version="1.0" encoding="utf-8"?>
+<file path=ppt/slides/slide6.xml><?xml version="1.0" encoding="utf-8"?>
 <p:sld xmlns:a="http://schemas.openxmlformats.org/drawingml/2006/main" xmlns:r="http://schemas.openxmlformats.org/officeDocument/2006/relationships" xmlns:p="http://schemas.openxmlformats.org/presentationml/2006/main">
   <p:cSld>
     <p:spTree>
@@ -3831,7 +3954,7 @@
 </p:sld>
 </file>
 
-<file path=ppt/slides/slide6.xml><?xml version="1.0" encoding="utf-8"?>
+<file path=ppt/slides/slide7.xml><?xml version="1.0" encoding="utf-8"?>
 <p:sld xmlns:a="http://schemas.openxmlformats.org/drawingml/2006/main" xmlns:r="http://schemas.openxmlformats.org/officeDocument/2006/relationships" xmlns:p="http://schemas.openxmlformats.org/presentationml/2006/main">
   <p:cSld>
     <p:spTree>
@@ -3890,7 +4013,7 @@
 </p:sld>
 </file>
 
-<file path=ppt/slides/slide7.xml><?xml version="1.0" encoding="utf-8"?>
+<file path=ppt/slides/slide8.xml><?xml version="1.0" encoding="utf-8"?>
 <p:sld xmlns:a="http://schemas.openxmlformats.org/drawingml/2006/main" xmlns:r="http://schemas.openxmlformats.org/officeDocument/2006/relationships" xmlns:p="http://schemas.openxmlformats.org/presentationml/2006/main">
   <p:cSld>
     <p:spTree>
@@ -3949,7 +4072,7 @@
 </p:sld>
 </file>
 
-<file path=ppt/slides/slide8.xml><?xml version="1.0" encoding="utf-8"?>
+<file path=ppt/slides/slide9.xml><?xml version="1.0" encoding="utf-8"?>
 <p:sld xmlns:a="http://schemas.openxmlformats.org/drawingml/2006/main" xmlns:r="http://schemas.openxmlformats.org/officeDocument/2006/relationships" xmlns:p="http://schemas.openxmlformats.org/presentationml/2006/main">
   <p:cSld>
     <p:spTree>
@@ -4027,65 +4150,6 @@
     <p:extLst>
       <p:ext uri="{BB962C8B-B14F-4D97-AF65-F5344CB8AC3E}">
         <p14:creationId xmlns:p14="http://schemas.microsoft.com/office/powerpoint/2010/main" val="2606633921"/>
-      </p:ext>
-    </p:extLst>
-  </p:cSld>
-  <p:clrMapOvr>
-    <a:masterClrMapping/>
-  </p:clrMapOvr>
-</p:sld>
-</file>
-
-<file path=ppt/slides/slide9.xml><?xml version="1.0" encoding="utf-8"?>
-<p:sld xmlns:a="http://schemas.openxmlformats.org/drawingml/2006/main" xmlns:r="http://schemas.openxmlformats.org/officeDocument/2006/relationships" xmlns:p="http://schemas.openxmlformats.org/presentationml/2006/main">
-  <p:cSld>
-    <p:spTree>
-      <p:nvGrpSpPr>
-        <p:cNvPr id="1" name=""/>
-        <p:cNvGrpSpPr/>
-        <p:nvPr/>
-      </p:nvGrpSpPr>
-      <p:grpSpPr>
-        <a:xfrm>
-          <a:off x="0" y="0"/>
-          <a:ext cx="0" cy="0"/>
-          <a:chOff x="0" y="0"/>
-          <a:chExt cx="0" cy="0"/>
-        </a:xfrm>
-      </p:grpSpPr>
-      <p:pic>
-        <p:nvPicPr>
-          <p:cNvPr id="3" name="Picture 2"/>
-          <p:cNvPicPr>
-            <a:picLocks noChangeAspect="1"/>
-          </p:cNvPicPr>
-          <p:nvPr/>
-        </p:nvPicPr>
-        <p:blipFill>
-          <a:blip r:embed="rId2"/>
-          <a:stretch>
-            <a:fillRect/>
-          </a:stretch>
-        </p:blipFill>
-        <p:spPr>
-          <a:xfrm>
-            <a:off x="1930400" y="620712"/>
-            <a:ext cx="7137400" cy="4014788"/>
-          </a:xfrm>
-          <a:prstGeom prst="rect">
-            <a:avLst/>
-          </a:prstGeom>
-          <a:ln>
-            <a:solidFill>
-              <a:schemeClr val="tx1"/>
-            </a:solidFill>
-          </a:ln>
-        </p:spPr>
-      </p:pic>
-    </p:spTree>
-    <p:extLst>
-      <p:ext uri="{BB962C8B-B14F-4D97-AF65-F5344CB8AC3E}">
-        <p14:creationId xmlns:p14="http://schemas.microsoft.com/office/powerpoint/2010/main" val="3486349836"/>
       </p:ext>
     </p:extLst>
   </p:cSld>

</xml_diff>